<commit_message>
Color scheme coa added
</commit_message>
<xml_diff>
--- a/Week_05_DRY/10_Refactor/Debugging, Refactoring, and more.pptx
+++ b/Week_05_DRY/10_Refactor/Debugging, Refactoring, and more.pptx
@@ -5,7 +5,7 @@
     <p:sldMasterId id="2147483648" r:id="rId1"/>
   </p:sldMasterIdLst>
   <p:notesMasterIdLst>
-    <p:notesMasterId r:id="rId15"/>
+    <p:notesMasterId r:id="rId16"/>
   </p:notesMasterIdLst>
   <p:sldIdLst>
     <p:sldId id="256" r:id="rId2"/>
@@ -16,11 +16,12 @@
     <p:sldId id="260" r:id="rId7"/>
     <p:sldId id="262" r:id="rId8"/>
     <p:sldId id="261" r:id="rId9"/>
-    <p:sldId id="263" r:id="rId10"/>
-    <p:sldId id="264" r:id="rId11"/>
-    <p:sldId id="265" r:id="rId12"/>
-    <p:sldId id="266" r:id="rId13"/>
-    <p:sldId id="267" r:id="rId14"/>
+    <p:sldId id="269" r:id="rId10"/>
+    <p:sldId id="263" r:id="rId11"/>
+    <p:sldId id="264" r:id="rId12"/>
+    <p:sldId id="265" r:id="rId13"/>
+    <p:sldId id="266" r:id="rId14"/>
+    <p:sldId id="267" r:id="rId15"/>
   </p:sldIdLst>
   <p:sldSz cx="9144000" cy="6858000" type="screen4x3"/>
   <p:notesSz cx="6858000" cy="9144000"/>
@@ -204,7 +205,7 @@
           <a:p>
             <a:fld id="{4AAF5A05-E65B-4952-9AD3-B4552CF0586F}" type="datetimeFigureOut">
               <a:rPr lang="en-US" smtClean="0"/>
-              <a:t>8/28/2013</a:t>
+              <a:t>9/12/2013</a:t>
             </a:fld>
             <a:endParaRPr lang="en-US"/>
           </a:p>
@@ -655,7 +656,7 @@
           <a:p>
             <a:fld id="{A4D54E42-F95B-49AF-AABA-5CBE07BD39AE}" type="slidenum">
               <a:rPr lang="en-US" smtClean="0"/>
-              <a:t>12</a:t>
+              <a:t>13</a:t>
             </a:fld>
             <a:endParaRPr lang="en-US"/>
           </a:p>
@@ -855,7 +856,7 @@
           <a:p>
             <a:fld id="{71021D4B-CD1E-4DC3-84F6-9E4E1148EB8C}" type="datetimeFigureOut">
               <a:rPr lang="en-US" smtClean="0"/>
-              <a:t>8/28/2013</a:t>
+              <a:t>9/12/2013</a:t>
             </a:fld>
             <a:endParaRPr lang="en-US"/>
           </a:p>
@@ -1025,7 +1026,7 @@
           <a:p>
             <a:fld id="{71021D4B-CD1E-4DC3-84F6-9E4E1148EB8C}" type="datetimeFigureOut">
               <a:rPr lang="en-US" smtClean="0"/>
-              <a:t>8/28/2013</a:t>
+              <a:t>9/12/2013</a:t>
             </a:fld>
             <a:endParaRPr lang="en-US"/>
           </a:p>
@@ -1205,7 +1206,7 @@
           <a:p>
             <a:fld id="{71021D4B-CD1E-4DC3-84F6-9E4E1148EB8C}" type="datetimeFigureOut">
               <a:rPr lang="en-US" smtClean="0"/>
-              <a:t>8/28/2013</a:t>
+              <a:t>9/12/2013</a:t>
             </a:fld>
             <a:endParaRPr lang="en-US"/>
           </a:p>
@@ -1375,7 +1376,7 @@
           <a:p>
             <a:fld id="{71021D4B-CD1E-4DC3-84F6-9E4E1148EB8C}" type="datetimeFigureOut">
               <a:rPr lang="en-US" smtClean="0"/>
-              <a:t>8/28/2013</a:t>
+              <a:t>9/12/2013</a:t>
             </a:fld>
             <a:endParaRPr lang="en-US"/>
           </a:p>
@@ -1621,7 +1622,7 @@
           <a:p>
             <a:fld id="{71021D4B-CD1E-4DC3-84F6-9E4E1148EB8C}" type="datetimeFigureOut">
               <a:rPr lang="en-US" smtClean="0"/>
-              <a:t>8/28/2013</a:t>
+              <a:t>9/12/2013</a:t>
             </a:fld>
             <a:endParaRPr lang="en-US"/>
           </a:p>
@@ -1909,7 +1910,7 @@
           <a:p>
             <a:fld id="{71021D4B-CD1E-4DC3-84F6-9E4E1148EB8C}" type="datetimeFigureOut">
               <a:rPr lang="en-US" smtClean="0"/>
-              <a:t>8/28/2013</a:t>
+              <a:t>9/12/2013</a:t>
             </a:fld>
             <a:endParaRPr lang="en-US"/>
           </a:p>
@@ -2331,7 +2332,7 @@
           <a:p>
             <a:fld id="{71021D4B-CD1E-4DC3-84F6-9E4E1148EB8C}" type="datetimeFigureOut">
               <a:rPr lang="en-US" smtClean="0"/>
-              <a:t>8/28/2013</a:t>
+              <a:t>9/12/2013</a:t>
             </a:fld>
             <a:endParaRPr lang="en-US"/>
           </a:p>
@@ -2449,7 +2450,7 @@
           <a:p>
             <a:fld id="{71021D4B-CD1E-4DC3-84F6-9E4E1148EB8C}" type="datetimeFigureOut">
               <a:rPr lang="en-US" smtClean="0"/>
-              <a:t>8/28/2013</a:t>
+              <a:t>9/12/2013</a:t>
             </a:fld>
             <a:endParaRPr lang="en-US"/>
           </a:p>
@@ -2544,7 +2545,7 @@
           <a:p>
             <a:fld id="{71021D4B-CD1E-4DC3-84F6-9E4E1148EB8C}" type="datetimeFigureOut">
               <a:rPr lang="en-US" smtClean="0"/>
-              <a:t>8/28/2013</a:t>
+              <a:t>9/12/2013</a:t>
             </a:fld>
             <a:endParaRPr lang="en-US"/>
           </a:p>
@@ -2821,7 +2822,7 @@
           <a:p>
             <a:fld id="{71021D4B-CD1E-4DC3-84F6-9E4E1148EB8C}" type="datetimeFigureOut">
               <a:rPr lang="en-US" smtClean="0"/>
-              <a:t>8/28/2013</a:t>
+              <a:t>9/12/2013</a:t>
             </a:fld>
             <a:endParaRPr lang="en-US"/>
           </a:p>
@@ -3074,7 +3075,7 @@
           <a:p>
             <a:fld id="{71021D4B-CD1E-4DC3-84F6-9E4E1148EB8C}" type="datetimeFigureOut">
               <a:rPr lang="en-US" smtClean="0"/>
-              <a:t>8/28/2013</a:t>
+              <a:t>9/12/2013</a:t>
             </a:fld>
             <a:endParaRPr lang="en-US"/>
           </a:p>
@@ -3287,7 +3288,7 @@
           <a:p>
             <a:fld id="{71021D4B-CD1E-4DC3-84F6-9E4E1148EB8C}" type="datetimeFigureOut">
               <a:rPr lang="en-US" smtClean="0"/>
-              <a:t>8/28/2013</a:t>
+              <a:t>9/12/2013</a:t>
             </a:fld>
             <a:endParaRPr lang="en-US"/>
           </a:p>
@@ -3679,11 +3680,7 @@
           <a:p>
             <a:r>
               <a:rPr lang="en-US" dirty="0" smtClean="0"/>
-              <a:t>Debugging, Refactoring, </a:t>
-            </a:r>
-            <a:r>
-              <a:rPr lang="en-US" dirty="0" smtClean="0"/>
-              <a:t>Switch Blocks, and This</a:t>
+              <a:t>Debugging, Refactoring, Switch Blocks, and This</a:t>
             </a:r>
             <a:endParaRPr lang="en-US" dirty="0"/>
           </a:p>
@@ -3755,7 +3752,7 @@
           <a:p>
             <a:r>
               <a:rPr lang="en-US" dirty="0" smtClean="0"/>
-              <a:t>Debugging: Level One</a:t>
+              <a:t>Debugging</a:t>
             </a:r>
             <a:endParaRPr lang="en-US" dirty="0"/>
           </a:p>
@@ -3774,102 +3771,84 @@
         <p:spPr/>
         <p:txBody>
           <a:bodyPr>
-            <a:normAutofit lnSpcReduction="10000"/>
+            <a:normAutofit fontScale="92500" lnSpcReduction="20000"/>
           </a:bodyPr>
           <a:lstStyle/>
           <a:p>
-            <a:r>
-              <a:rPr lang="en-US" dirty="0" smtClean="0"/>
-              <a:t>Check </a:t>
-            </a:r>
-            <a:r>
-              <a:rPr lang="en-US" dirty="0"/>
-              <a:t>for errors </a:t>
-            </a:r>
-            <a:r>
-              <a:rPr lang="en-US" dirty="0" smtClean="0"/>
-              <a:t>(red text, aligned right) </a:t>
-            </a:r>
-            <a:r>
-              <a:rPr lang="en-US" dirty="0"/>
-              <a:t>in </a:t>
-            </a:r>
-            <a:r>
-              <a:rPr lang="en-US" dirty="0" smtClean="0"/>
-              <a:t>console</a:t>
+            <a:pPr marL="0" indent="0">
+              <a:buNone/>
+            </a:pPr>
+            <a:r>
+              <a:rPr lang="en-US" dirty="0" smtClean="0"/>
+              <a:t>ALWAYS START BY DEFINING THE PROBLEM</a:t>
+            </a:r>
+          </a:p>
+          <a:p>
+            <a:r>
+              <a:rPr lang="en-US" dirty="0" smtClean="0"/>
+              <a:t>“The image is not moving”</a:t>
+            </a:r>
+          </a:p>
+          <a:p>
+            <a:r>
+              <a:rPr lang="en-US" dirty="0" smtClean="0"/>
+              <a:t>“The appended html is not showing up”</a:t>
+            </a:r>
+          </a:p>
+          <a:p>
+            <a:r>
+              <a:rPr lang="en-US" dirty="0" smtClean="0"/>
+              <a:t>“None of my code works”</a:t>
+            </a:r>
+            <a:endParaRPr lang="en-US" dirty="0"/>
+          </a:p>
+          <a:p>
+            <a:pPr marL="0" indent="0">
+              <a:buNone/>
+            </a:pPr>
+            <a:endParaRPr lang="en-US" dirty="0" smtClean="0"/>
+          </a:p>
+          <a:p>
+            <a:pPr marL="0" indent="0">
+              <a:buNone/>
+            </a:pPr>
+            <a:r>
+              <a:rPr lang="en-US" dirty="0" smtClean="0"/>
+              <a:t>This will tell you where to start your hunt</a:t>
+            </a:r>
+          </a:p>
+          <a:p>
+            <a:r>
+              <a:rPr lang="en-US" dirty="0" smtClean="0"/>
+              <a:t>Image not moving</a:t>
             </a:r>
           </a:p>
           <a:p>
             <a:pPr lvl="1"/>
             <a:r>
-              <a:rPr lang="en-US" dirty="0"/>
-              <a:t>To access debugging console</a:t>
-            </a:r>
-          </a:p>
-          <a:p>
-            <a:pPr lvl="2"/>
-            <a:r>
-              <a:rPr lang="en-US" dirty="0"/>
-              <a:t>PC: CTRL+SHIFT+J</a:t>
-            </a:r>
-          </a:p>
-          <a:p>
-            <a:pPr lvl="2"/>
-            <a:r>
-              <a:rPr lang="en-US" dirty="0"/>
-              <a:t>Mac: </a:t>
-            </a:r>
-            <a:r>
-              <a:rPr lang="en-US" dirty="0" smtClean="0"/>
-              <a:t>COMMAND+OPTION+J</a:t>
-            </a:r>
-            <a:endParaRPr lang="en-US" dirty="0"/>
-          </a:p>
-          <a:p>
-            <a:r>
-              <a:rPr lang="en-US" dirty="0"/>
-              <a:t>Click the </a:t>
-            </a:r>
-            <a:r>
-              <a:rPr lang="en-US" dirty="0" smtClean="0"/>
-              <a:t>error</a:t>
+              <a:rPr lang="en-US" dirty="0" smtClean="0"/>
+              <a:t>find the code that makes the image move</a:t>
+            </a:r>
+          </a:p>
+          <a:p>
+            <a:r>
+              <a:rPr lang="en-US" dirty="0" smtClean="0"/>
+              <a:t>None of my code works</a:t>
             </a:r>
           </a:p>
           <a:p>
             <a:pPr lvl="1"/>
             <a:r>
               <a:rPr lang="en-US" dirty="0" smtClean="0"/>
-              <a:t>Goes to where computer thinks error is</a:t>
-            </a:r>
-            <a:endParaRPr lang="en-US" dirty="0" smtClean="0"/>
-          </a:p>
-          <a:p>
-            <a:pPr lvl="1"/>
-            <a:r>
-              <a:rPr lang="en-US" dirty="0" smtClean="0"/>
-              <a:t>The </a:t>
-            </a:r>
-            <a:r>
-              <a:rPr lang="en-US" dirty="0"/>
-              <a:t>location may not be correct but is a good place to start</a:t>
-            </a:r>
-          </a:p>
-          <a:p>
-            <a:pPr lvl="2"/>
-            <a:r>
-              <a:rPr lang="en-US" dirty="0"/>
-              <a:t>Ex: Unbalanced brackets or parentheses</a:t>
-            </a:r>
-          </a:p>
-          <a:p>
-            <a:endParaRPr lang="en-US" dirty="0"/>
+              <a:t>Syntax error, check console</a:t>
+            </a:r>
           </a:p>
         </p:txBody>
       </p:sp>
     </p:spTree>
     <p:extLst>
       <p:ext uri="{BB962C8B-B14F-4D97-AF65-F5344CB8AC3E}">
-        <p14:creationId xmlns:p14="http://schemas.microsoft.com/office/powerpoint/2010/main" val="2684947582"/>
+        <p14:creationId xmlns:p14="http://schemas.microsoft.com/office/powerpoint/2010/main" val="715287420"/>
       </p:ext>
     </p:extLst>
   </p:cSld>
@@ -3913,7 +3892,7 @@
           <a:p>
             <a:r>
               <a:rPr lang="en-US" dirty="0" smtClean="0"/>
-              <a:t>Debugging: Level Two</a:t>
+              <a:t>Debugging: Level One</a:t>
             </a:r>
             <a:endParaRPr lang="en-US" dirty="0"/>
           </a:p>
@@ -3938,119 +3917,95 @@
           <a:p>
             <a:r>
               <a:rPr lang="en-US" dirty="0" smtClean="0"/>
-              <a:t>So no red errors but not getting the right answer?</a:t>
-            </a:r>
-          </a:p>
-          <a:p>
-            <a:r>
-              <a:rPr lang="en-US" dirty="0" smtClean="0"/>
-              <a:t>Try console.log</a:t>
+              <a:t>Check </a:t>
+            </a:r>
+            <a:r>
+              <a:rPr lang="en-US" dirty="0"/>
+              <a:t>for errors </a:t>
+            </a:r>
+            <a:r>
+              <a:rPr lang="en-US" dirty="0" smtClean="0"/>
+              <a:t>(red text, aligned right) </a:t>
+            </a:r>
+            <a:r>
+              <a:rPr lang="en-US" dirty="0"/>
+              <a:t>in </a:t>
+            </a:r>
+            <a:r>
+              <a:rPr lang="en-US" dirty="0" smtClean="0"/>
+              <a:t>console</a:t>
             </a:r>
           </a:p>
           <a:p>
             <a:pPr lvl="1"/>
             <a:r>
-              <a:rPr lang="en-US" dirty="0" smtClean="0"/>
-              <a:t>Ex: </a:t>
-            </a:r>
-          </a:p>
-          <a:p>
-            <a:pPr marL="457200" lvl="1" indent="0">
-              <a:buNone/>
-            </a:pPr>
-            <a:r>
-              <a:rPr lang="en-US" dirty="0" err="1" smtClean="0"/>
-              <a:t>var</a:t>
-            </a:r>
-            <a:r>
-              <a:rPr lang="en-US" dirty="0" smtClean="0"/>
-              <a:t> </a:t>
-            </a:r>
-            <a:r>
-              <a:rPr lang="en-US" dirty="0" err="1" smtClean="0"/>
-              <a:t>stringOfNames</a:t>
-            </a:r>
-            <a:r>
-              <a:rPr lang="en-US" dirty="0" smtClean="0"/>
-              <a:t>=“”;</a:t>
+              <a:rPr lang="en-US" dirty="0"/>
+              <a:t>To access debugging console</a:t>
+            </a:r>
+          </a:p>
+          <a:p>
+            <a:pPr lvl="2"/>
+            <a:r>
+              <a:rPr lang="en-US" dirty="0"/>
+              <a:t>PC: CTRL+SHIFT+J</a:t>
+            </a:r>
+          </a:p>
+          <a:p>
+            <a:pPr lvl="2"/>
+            <a:r>
+              <a:rPr lang="en-US" dirty="0"/>
+              <a:t>Mac: </a:t>
+            </a:r>
+            <a:r>
+              <a:rPr lang="en-US" dirty="0" smtClean="0"/>
+              <a:t>COMMAND+OPTION+J</a:t>
             </a:r>
             <a:endParaRPr lang="en-US" dirty="0"/>
           </a:p>
           <a:p>
-            <a:pPr marL="457200" lvl="1" indent="0">
-              <a:buNone/>
-            </a:pPr>
-            <a:r>
-              <a:rPr lang="en-US" dirty="0" smtClean="0"/>
-              <a:t>[“</a:t>
-            </a:r>
-            <a:r>
-              <a:rPr lang="en-US" dirty="0" err="1" smtClean="0"/>
-              <a:t>Bob”,”Joe</a:t>
-            </a:r>
-            <a:r>
-              <a:rPr lang="en-US" dirty="0" smtClean="0"/>
-              <a:t>”].</a:t>
-            </a:r>
-            <a:r>
-              <a:rPr lang="en-US" dirty="0" err="1" smtClean="0"/>
-              <a:t>forEach</a:t>
-            </a:r>
-            <a:r>
-              <a:rPr lang="en-US" dirty="0" smtClean="0"/>
-              <a:t>(function(element){</a:t>
-            </a:r>
-          </a:p>
-          <a:p>
-            <a:pPr marL="457200" lvl="1" indent="0">
-              <a:buNone/>
-            </a:pPr>
-            <a:r>
-              <a:rPr lang="en-US" dirty="0" smtClean="0"/>
-              <a:t>	</a:t>
-            </a:r>
-            <a:r>
-              <a:rPr lang="en-US" dirty="0" err="1" smtClean="0"/>
-              <a:t>stringOfNames</a:t>
-            </a:r>
-            <a:r>
-              <a:rPr lang="en-US" dirty="0" smtClean="0"/>
-              <a:t>-=element+”,”;</a:t>
-            </a:r>
-          </a:p>
-          <a:p>
-            <a:pPr marL="457200" lvl="1" indent="0">
-              <a:buNone/>
-            </a:pPr>
-            <a:r>
-              <a:rPr lang="en-US" dirty="0" smtClean="0"/>
-              <a:t>	console.log(</a:t>
-            </a:r>
-            <a:r>
-              <a:rPr lang="en-US" dirty="0" err="1" smtClean="0"/>
-              <a:t>stringOfNames</a:t>
-            </a:r>
-            <a:r>
-              <a:rPr lang="en-US" dirty="0" smtClean="0"/>
-              <a:t>);</a:t>
-            </a:r>
+            <a:r>
+              <a:rPr lang="en-US" dirty="0"/>
+              <a:t>Click the </a:t>
+            </a:r>
+            <a:r>
+              <a:rPr lang="en-US" dirty="0" smtClean="0"/>
+              <a:t>error</a:t>
+            </a:r>
+          </a:p>
+          <a:p>
+            <a:pPr lvl="1"/>
+            <a:r>
+              <a:rPr lang="en-US" dirty="0" smtClean="0"/>
+              <a:t>Goes to where computer thinks error is</a:t>
+            </a:r>
+          </a:p>
+          <a:p>
+            <a:pPr lvl="1"/>
+            <a:r>
+              <a:rPr lang="en-US" dirty="0" smtClean="0"/>
+              <a:t>The </a:t>
+            </a:r>
+            <a:r>
+              <a:rPr lang="en-US" dirty="0"/>
+              <a:t>location may not be correct but is a good place to start</a:t>
+            </a:r>
+          </a:p>
+          <a:p>
+            <a:pPr lvl="2"/>
+            <a:r>
+              <a:rPr lang="en-US" dirty="0"/>
+              <a:t>Ex: Unbalanced brackets or parentheses</a:t>
+            </a:r>
+          </a:p>
+          <a:p>
             <a:endParaRPr lang="en-US" dirty="0"/>
-          </a:p>
-          <a:p>
-            <a:pPr marL="457200" lvl="1" indent="0">
-              <a:buNone/>
-            </a:pPr>
-            <a:r>
-              <a:rPr lang="en-US" dirty="0" smtClean="0"/>
-              <a:t>});</a:t>
-            </a:r>
           </a:p>
         </p:txBody>
       </p:sp>
     </p:spTree>
     <p:extLst>
       <p:ext uri="{BB962C8B-B14F-4D97-AF65-F5344CB8AC3E}">
-        <p14:creationId xmlns:p14="http://schemas.microsoft.com/office/powerpoint/2010/main" val="1587272920"/>
+        <p14:creationId xmlns:p14="http://schemas.microsoft.com/office/powerpoint/2010/main" val="2684947582"/>
       </p:ext>
     </p:extLst>
   </p:cSld>
@@ -4094,6 +4049,187 @@
           <a:p>
             <a:r>
               <a:rPr lang="en-US" dirty="0" smtClean="0"/>
+              <a:t>Debugging: Level Two</a:t>
+            </a:r>
+            <a:endParaRPr lang="en-US" dirty="0"/>
+          </a:p>
+        </p:txBody>
+      </p:sp>
+      <p:sp>
+        <p:nvSpPr>
+          <p:cNvPr id="3" name="Content Placeholder 2"/>
+          <p:cNvSpPr>
+            <a:spLocks noGrp="1"/>
+          </p:cNvSpPr>
+          <p:nvPr>
+            <p:ph idx="1"/>
+          </p:nvPr>
+        </p:nvSpPr>
+        <p:spPr/>
+        <p:txBody>
+          <a:bodyPr>
+            <a:normAutofit lnSpcReduction="10000"/>
+          </a:bodyPr>
+          <a:lstStyle/>
+          <a:p>
+            <a:r>
+              <a:rPr lang="en-US" dirty="0" smtClean="0"/>
+              <a:t>So no red errors but not getting the right answer?</a:t>
+            </a:r>
+          </a:p>
+          <a:p>
+            <a:r>
+              <a:rPr lang="en-US" dirty="0" smtClean="0"/>
+              <a:t>Try console.log</a:t>
+            </a:r>
+          </a:p>
+          <a:p>
+            <a:pPr lvl="1"/>
+            <a:r>
+              <a:rPr lang="en-US" dirty="0" smtClean="0"/>
+              <a:t>Ex: </a:t>
+            </a:r>
+          </a:p>
+          <a:p>
+            <a:pPr marL="457200" lvl="1" indent="0">
+              <a:buNone/>
+            </a:pPr>
+            <a:r>
+              <a:rPr lang="en-US" dirty="0" err="1" smtClean="0"/>
+              <a:t>var</a:t>
+            </a:r>
+            <a:r>
+              <a:rPr lang="en-US" dirty="0" smtClean="0"/>
+              <a:t> </a:t>
+            </a:r>
+            <a:r>
+              <a:rPr lang="en-US" dirty="0" err="1" smtClean="0"/>
+              <a:t>stringOfNames</a:t>
+            </a:r>
+            <a:r>
+              <a:rPr lang="en-US" dirty="0" smtClean="0"/>
+              <a:t>=“”;</a:t>
+            </a:r>
+            <a:endParaRPr lang="en-US" dirty="0"/>
+          </a:p>
+          <a:p>
+            <a:pPr marL="457200" lvl="1" indent="0">
+              <a:buNone/>
+            </a:pPr>
+            <a:r>
+              <a:rPr lang="en-US" dirty="0" smtClean="0"/>
+              <a:t>[“</a:t>
+            </a:r>
+            <a:r>
+              <a:rPr lang="en-US" dirty="0" err="1" smtClean="0"/>
+              <a:t>Bob”,”Joe</a:t>
+            </a:r>
+            <a:r>
+              <a:rPr lang="en-US" dirty="0" smtClean="0"/>
+              <a:t>”].</a:t>
+            </a:r>
+            <a:r>
+              <a:rPr lang="en-US" dirty="0" err="1" smtClean="0"/>
+              <a:t>forEach</a:t>
+            </a:r>
+            <a:r>
+              <a:rPr lang="en-US" dirty="0" smtClean="0"/>
+              <a:t>(function(element){</a:t>
+            </a:r>
+          </a:p>
+          <a:p>
+            <a:pPr marL="457200" lvl="1" indent="0">
+              <a:buNone/>
+            </a:pPr>
+            <a:r>
+              <a:rPr lang="en-US" dirty="0" smtClean="0"/>
+              <a:t>	</a:t>
+            </a:r>
+            <a:r>
+              <a:rPr lang="en-US" dirty="0" err="1" smtClean="0"/>
+              <a:t>stringOfNames</a:t>
+            </a:r>
+            <a:r>
+              <a:rPr lang="en-US" dirty="0" smtClean="0"/>
+              <a:t>-=element+”,”;</a:t>
+            </a:r>
+          </a:p>
+          <a:p>
+            <a:pPr marL="457200" lvl="1" indent="0">
+              <a:buNone/>
+            </a:pPr>
+            <a:r>
+              <a:rPr lang="en-US" dirty="0" smtClean="0"/>
+              <a:t>	console.log(</a:t>
+            </a:r>
+            <a:r>
+              <a:rPr lang="en-US" dirty="0" err="1" smtClean="0"/>
+              <a:t>stringOfNames</a:t>
+            </a:r>
+            <a:r>
+              <a:rPr lang="en-US" dirty="0" smtClean="0"/>
+              <a:t>);</a:t>
+            </a:r>
+            <a:endParaRPr lang="en-US" dirty="0"/>
+          </a:p>
+          <a:p>
+            <a:pPr marL="457200" lvl="1" indent="0">
+              <a:buNone/>
+            </a:pPr>
+            <a:r>
+              <a:rPr lang="en-US" dirty="0" smtClean="0"/>
+              <a:t>});</a:t>
+            </a:r>
+          </a:p>
+        </p:txBody>
+      </p:sp>
+    </p:spTree>
+    <p:extLst>
+      <p:ext uri="{BB962C8B-B14F-4D97-AF65-F5344CB8AC3E}">
+        <p14:creationId xmlns:p14="http://schemas.microsoft.com/office/powerpoint/2010/main" val="1587272920"/>
+      </p:ext>
+    </p:extLst>
+  </p:cSld>
+  <p:clrMapOvr>
+    <a:masterClrMapping/>
+  </p:clrMapOvr>
+</p:sld>
+</file>
+
+<file path=ppt/slides/slide13.xml><?xml version="1.0" encoding="utf-8"?>
+<p:sld xmlns:a="http://schemas.openxmlformats.org/drawingml/2006/main" xmlns:r="http://schemas.openxmlformats.org/officeDocument/2006/relationships" xmlns:p="http://schemas.openxmlformats.org/presentationml/2006/main">
+  <p:cSld>
+    <p:spTree>
+      <p:nvGrpSpPr>
+        <p:cNvPr id="1" name=""/>
+        <p:cNvGrpSpPr/>
+        <p:nvPr/>
+      </p:nvGrpSpPr>
+      <p:grpSpPr>
+        <a:xfrm>
+          <a:off x="0" y="0"/>
+          <a:ext cx="0" cy="0"/>
+          <a:chOff x="0" y="0"/>
+          <a:chExt cx="0" cy="0"/>
+        </a:xfrm>
+      </p:grpSpPr>
+      <p:sp>
+        <p:nvSpPr>
+          <p:cNvPr id="2" name="Title 1"/>
+          <p:cNvSpPr>
+            <a:spLocks noGrp="1"/>
+          </p:cNvSpPr>
+          <p:nvPr>
+            <p:ph type="title"/>
+          </p:nvPr>
+        </p:nvSpPr>
+        <p:spPr/>
+        <p:txBody>
+          <a:bodyPr/>
+          <a:lstStyle/>
+          <a:p>
+            <a:r>
+              <a:rPr lang="en-US" dirty="0" smtClean="0"/>
               <a:t>Debugging: Level Three</a:t>
             </a:r>
             <a:endParaRPr lang="en-US" dirty="0"/>
@@ -4166,7 +4302,7 @@
 </p:sld>
 </file>
 
-<file path=ppt/slides/slide13.xml><?xml version="1.0" encoding="utf-8"?>
+<file path=ppt/slides/slide14.xml><?xml version="1.0" encoding="utf-8"?>
 <p:sld xmlns:a="http://schemas.openxmlformats.org/drawingml/2006/main" xmlns:r="http://schemas.openxmlformats.org/officeDocument/2006/relationships" xmlns:p="http://schemas.openxmlformats.org/presentationml/2006/main">
   <p:cSld>
     <p:spTree>
@@ -5246,11 +5382,7 @@
           <a:p>
             <a:r>
               <a:rPr lang="en-US" dirty="0" smtClean="0"/>
-              <a:t>Create classes for large CSS changes in </a:t>
-            </a:r>
-            <a:r>
-              <a:rPr lang="en-US" dirty="0" smtClean="0"/>
-              <a:t>JS</a:t>
+              <a:t>Create classes for large CSS changes in JS</a:t>
             </a:r>
           </a:p>
           <a:p>
@@ -5338,11 +5470,7 @@
           <a:p>
             <a:r>
               <a:rPr lang="en-US" dirty="0" smtClean="0"/>
-              <a:t>Use </a:t>
-            </a:r>
-            <a:r>
-              <a:rPr lang="en-US" dirty="0" smtClean="0"/>
-              <a:t>functions</a:t>
+              <a:t>Use functions</a:t>
             </a:r>
             <a:endParaRPr lang="en-US" dirty="0"/>
           </a:p>
@@ -5361,7 +5489,6 @@
               <a:rPr lang="en-US" dirty="0" smtClean="0"/>
               <a:t>Use arrays</a:t>
             </a:r>
-            <a:endParaRPr lang="en-US" dirty="0" smtClean="0"/>
           </a:p>
           <a:p>
             <a:r>
@@ -5477,22 +5604,22 @@
       </p:grpSpPr>
       <p:sp>
         <p:nvSpPr>
-          <p:cNvPr id="2" name="Title 1"/>
-          <p:cNvSpPr>
-            <a:spLocks noGrp="1"/>
-          </p:cNvSpPr>
-          <p:nvPr>
-            <p:ph type="title"/>
-          </p:nvPr>
-        </p:nvSpPr>
-        <p:spPr/>
-        <p:txBody>
-          <a:bodyPr/>
-          <a:lstStyle/>
-          <a:p>
-            <a:r>
-              <a:rPr lang="en-US" dirty="0" smtClean="0"/>
-              <a:t>Debugging</a:t>
+          <p:cNvPr id="4" name="Title 3"/>
+          <p:cNvSpPr>
+            <a:spLocks noGrp="1"/>
+          </p:cNvSpPr>
+          <p:nvPr>
+            <p:ph type="ctrTitle"/>
+          </p:nvPr>
+        </p:nvSpPr>
+        <p:spPr/>
+        <p:txBody>
+          <a:bodyPr/>
+          <a:lstStyle/>
+          <a:p>
+            <a:r>
+              <a:rPr lang="en-US" dirty="0" smtClean="0"/>
+              <a:t>Exercise</a:t>
             </a:r>
             <a:endParaRPr lang="en-US" dirty="0"/>
           </a:p>
@@ -5500,95 +5627,31 @@
       </p:sp>
       <p:sp>
         <p:nvSpPr>
-          <p:cNvPr id="3" name="Content Placeholder 2"/>
-          <p:cNvSpPr>
-            <a:spLocks noGrp="1"/>
-          </p:cNvSpPr>
-          <p:nvPr>
-            <p:ph idx="1"/>
-          </p:nvPr>
-        </p:nvSpPr>
-        <p:spPr/>
-        <p:txBody>
-          <a:bodyPr>
-            <a:normAutofit fontScale="92500" lnSpcReduction="20000"/>
-          </a:bodyPr>
-          <a:lstStyle/>
-          <a:p>
-            <a:pPr marL="0" indent="0">
-              <a:buNone/>
-            </a:pPr>
-            <a:r>
-              <a:rPr lang="en-US" dirty="0" smtClean="0"/>
-              <a:t>ALWAYS START BY DEFINING THE PROBLEM</a:t>
-            </a:r>
-          </a:p>
-          <a:p>
-            <a:r>
-              <a:rPr lang="en-US" dirty="0" smtClean="0"/>
-              <a:t>“The image is not moving”</a:t>
-            </a:r>
-          </a:p>
-          <a:p>
-            <a:r>
-              <a:rPr lang="en-US" dirty="0" smtClean="0"/>
-              <a:t>“The appended html is not showing up”</a:t>
-            </a:r>
-          </a:p>
-          <a:p>
-            <a:r>
-              <a:rPr lang="en-US" dirty="0" smtClean="0"/>
-              <a:t>“None of my code works”</a:t>
+          <p:cNvPr id="5" name="Subtitle 4"/>
+          <p:cNvSpPr>
+            <a:spLocks noGrp="1"/>
+          </p:cNvSpPr>
+          <p:nvPr>
+            <p:ph type="subTitle" idx="1"/>
+          </p:nvPr>
+        </p:nvSpPr>
+        <p:spPr/>
+        <p:txBody>
+          <a:bodyPr/>
+          <a:lstStyle/>
+          <a:p>
+            <a:r>
+              <a:rPr lang="en-US" dirty="0" err="1" smtClean="0"/>
+              <a:t>COA_color_scheme</a:t>
             </a:r>
             <a:endParaRPr lang="en-US" dirty="0"/>
-          </a:p>
-          <a:p>
-            <a:pPr marL="0" indent="0">
-              <a:buNone/>
-            </a:pPr>
-            <a:endParaRPr lang="en-US" dirty="0" smtClean="0"/>
-          </a:p>
-          <a:p>
-            <a:pPr marL="0" indent="0">
-              <a:buNone/>
-            </a:pPr>
-            <a:r>
-              <a:rPr lang="en-US" dirty="0" smtClean="0"/>
-              <a:t>This will tell you where to start your hunt</a:t>
-            </a:r>
-          </a:p>
-          <a:p>
-            <a:r>
-              <a:rPr lang="en-US" dirty="0" smtClean="0"/>
-              <a:t>Image not moving</a:t>
-            </a:r>
-          </a:p>
-          <a:p>
-            <a:pPr lvl="1"/>
-            <a:r>
-              <a:rPr lang="en-US" dirty="0" smtClean="0"/>
-              <a:t>find the code that makes the image move</a:t>
-            </a:r>
-          </a:p>
-          <a:p>
-            <a:r>
-              <a:rPr lang="en-US" dirty="0" smtClean="0"/>
-              <a:t>None of my code works</a:t>
-            </a:r>
-          </a:p>
-          <a:p>
-            <a:pPr lvl="1"/>
-            <a:r>
-              <a:rPr lang="en-US" dirty="0" smtClean="0"/>
-              <a:t>Syntax error, check console</a:t>
-            </a:r>
           </a:p>
         </p:txBody>
       </p:sp>
     </p:spTree>
     <p:extLst>
       <p:ext uri="{BB962C8B-B14F-4D97-AF65-F5344CB8AC3E}">
-        <p14:creationId xmlns:p14="http://schemas.microsoft.com/office/powerpoint/2010/main" val="715287420"/>
+        <p14:creationId xmlns:p14="http://schemas.microsoft.com/office/powerpoint/2010/main" val="1893153496"/>
       </p:ext>
     </p:extLst>
   </p:cSld>

</xml_diff>